<commit_message>
PP & test plan update
</commit_message>
<xml_diff>
--- a/Chrono Timer v1.pptx
+++ b/Chrono Timer v1.pptx
@@ -6526,7 +6526,7 @@
           <a:p>
             <a:r>
               <a:rPr lang="en-US" sz="2000" dirty="0"/>
-              <a:t>Requirements: PARIND, USB</a:t>
+              <a:t>Requirements: PARIND, USB export</a:t>
             </a:r>
           </a:p>
           <a:p>
@@ -6535,7 +6535,7 @@
           <a:p>
             <a:r>
               <a:rPr lang="en-US" sz="2000" dirty="0"/>
-              <a:t>Approach: Focused in fixes and only Sprint 2 updates</a:t>
+              <a:t>Approach: Focused in fixing structure and only Sprint 2 updates</a:t>
             </a:r>
           </a:p>
           <a:p>
@@ -6558,7 +6558,7 @@
             <a:pPr lvl="1"/>
             <a:r>
               <a:rPr lang="en-US" sz="1800" dirty="0"/>
-              <a:t>Driver Class</a:t>
+              <a:t>What went into Driver class and what stayed in the interface</a:t>
             </a:r>
           </a:p>
         </p:txBody>

</xml_diff>

<commit_message>
all green but one!
</commit_message>
<xml_diff>
--- a/Chrono Timer v1.pptx
+++ b/Chrono Timer v1.pptx
@@ -844,7 +844,7 @@
           <a:p>
             <a:fld id="{F75BF691-E959-4260-BCAA-F3F15615AE81}" type="datetimeFigureOut">
               <a:rPr lang="en-US" smtClean="0"/>
-              <a:t>5/1/2016</a:t>
+              <a:t>5/2/2016</a:t>
             </a:fld>
             <a:endParaRPr lang="en-US"/>
           </a:p>
@@ -1095,7 +1095,7 @@
           <a:p>
             <a:fld id="{F75BF691-E959-4260-BCAA-F3F15615AE81}" type="datetimeFigureOut">
               <a:rPr lang="en-US" smtClean="0"/>
-              <a:t>5/1/2016</a:t>
+              <a:t>5/2/2016</a:t>
             </a:fld>
             <a:endParaRPr lang="en-US"/>
           </a:p>
@@ -1409,7 +1409,7 @@
           <a:p>
             <a:fld id="{F75BF691-E959-4260-BCAA-F3F15615AE81}" type="datetimeFigureOut">
               <a:rPr lang="en-US" smtClean="0"/>
-              <a:t>5/1/2016</a:t>
+              <a:t>5/2/2016</a:t>
             </a:fld>
             <a:endParaRPr lang="en-US"/>
           </a:p>
@@ -1750,7 +1750,7 @@
           <a:p>
             <a:fld id="{F75BF691-E959-4260-BCAA-F3F15615AE81}" type="datetimeFigureOut">
               <a:rPr lang="en-US" smtClean="0"/>
-              <a:t>5/1/2016</a:t>
+              <a:t>5/2/2016</a:t>
             </a:fld>
             <a:endParaRPr lang="en-US"/>
           </a:p>
@@ -2064,7 +2064,7 @@
           <a:p>
             <a:fld id="{F75BF691-E959-4260-BCAA-F3F15615AE81}" type="datetimeFigureOut">
               <a:rPr lang="en-US" smtClean="0"/>
-              <a:t>5/1/2016</a:t>
+              <a:t>5/2/2016</a:t>
             </a:fld>
             <a:endParaRPr lang="en-US"/>
           </a:p>
@@ -2457,7 +2457,7 @@
           <a:p>
             <a:fld id="{F75BF691-E959-4260-BCAA-F3F15615AE81}" type="datetimeFigureOut">
               <a:rPr lang="en-US" smtClean="0"/>
-              <a:t>5/1/2016</a:t>
+              <a:t>5/2/2016</a:t>
             </a:fld>
             <a:endParaRPr lang="en-US"/>
           </a:p>
@@ -2627,7 +2627,7 @@
           <a:p>
             <a:fld id="{F75BF691-E959-4260-BCAA-F3F15615AE81}" type="datetimeFigureOut">
               <a:rPr lang="en-US" smtClean="0"/>
-              <a:t>5/1/2016</a:t>
+              <a:t>5/2/2016</a:t>
             </a:fld>
             <a:endParaRPr lang="en-US"/>
           </a:p>
@@ -2807,7 +2807,7 @@
           <a:p>
             <a:fld id="{F75BF691-E959-4260-BCAA-F3F15615AE81}" type="datetimeFigureOut">
               <a:rPr lang="en-US" smtClean="0"/>
-              <a:t>5/1/2016</a:t>
+              <a:t>5/2/2016</a:t>
             </a:fld>
             <a:endParaRPr lang="en-US"/>
           </a:p>
@@ -2983,7 +2983,7 @@
           <a:p>
             <a:fld id="{F75BF691-E959-4260-BCAA-F3F15615AE81}" type="datetimeFigureOut">
               <a:rPr lang="en-US" smtClean="0"/>
-              <a:t>5/1/2016</a:t>
+              <a:t>5/2/2016</a:t>
             </a:fld>
             <a:endParaRPr lang="en-US"/>
           </a:p>
@@ -3230,7 +3230,7 @@
           <a:p>
             <a:fld id="{F75BF691-E959-4260-BCAA-F3F15615AE81}" type="datetimeFigureOut">
               <a:rPr lang="en-US" smtClean="0"/>
-              <a:t>5/1/2016</a:t>
+              <a:t>5/2/2016</a:t>
             </a:fld>
             <a:endParaRPr lang="en-US"/>
           </a:p>
@@ -3462,7 +3462,7 @@
           <a:p>
             <a:fld id="{F75BF691-E959-4260-BCAA-F3F15615AE81}" type="datetimeFigureOut">
               <a:rPr lang="en-US" smtClean="0"/>
-              <a:t>5/1/2016</a:t>
+              <a:t>5/2/2016</a:t>
             </a:fld>
             <a:endParaRPr lang="en-US"/>
           </a:p>
@@ -3836,7 +3836,7 @@
           <a:p>
             <a:fld id="{F75BF691-E959-4260-BCAA-F3F15615AE81}" type="datetimeFigureOut">
               <a:rPr lang="en-US" smtClean="0"/>
-              <a:t>5/1/2016</a:t>
+              <a:t>5/2/2016</a:t>
             </a:fld>
             <a:endParaRPr lang="en-US"/>
           </a:p>
@@ -3959,7 +3959,7 @@
           <a:p>
             <a:fld id="{F75BF691-E959-4260-BCAA-F3F15615AE81}" type="datetimeFigureOut">
               <a:rPr lang="en-US" smtClean="0"/>
-              <a:t>5/1/2016</a:t>
+              <a:t>5/2/2016</a:t>
             </a:fld>
             <a:endParaRPr lang="en-US"/>
           </a:p>
@@ -4054,7 +4054,7 @@
           <a:p>
             <a:fld id="{F75BF691-E959-4260-BCAA-F3F15615AE81}" type="datetimeFigureOut">
               <a:rPr lang="en-US" smtClean="0"/>
-              <a:t>5/1/2016</a:t>
+              <a:t>5/2/2016</a:t>
             </a:fld>
             <a:endParaRPr lang="en-US"/>
           </a:p>
@@ -4309,7 +4309,7 @@
           <a:p>
             <a:fld id="{F75BF691-E959-4260-BCAA-F3F15615AE81}" type="datetimeFigureOut">
               <a:rPr lang="en-US" smtClean="0"/>
-              <a:t>5/1/2016</a:t>
+              <a:t>5/2/2016</a:t>
             </a:fld>
             <a:endParaRPr lang="en-US"/>
           </a:p>
@@ -4572,7 +4572,7 @@
           <a:p>
             <a:fld id="{F75BF691-E959-4260-BCAA-F3F15615AE81}" type="datetimeFigureOut">
               <a:rPr lang="en-US" smtClean="0"/>
-              <a:t>5/1/2016</a:t>
+              <a:t>5/2/2016</a:t>
             </a:fld>
             <a:endParaRPr lang="en-US"/>
           </a:p>
@@ -5315,7 +5315,7 @@
           <a:p>
             <a:fld id="{F75BF691-E959-4260-BCAA-F3F15615AE81}" type="datetimeFigureOut">
               <a:rPr lang="en-US" smtClean="0"/>
-              <a:t>5/1/2016</a:t>
+              <a:t>5/2/2016</a:t>
             </a:fld>
             <a:endParaRPr lang="en-US"/>
           </a:p>
@@ -6898,8 +6898,8 @@
         </p:blipFill>
         <p:spPr>
           <a:xfrm>
-            <a:off x="4083614" y="400058"/>
-            <a:ext cx="3495355" cy="6121700"/>
+            <a:off x="3907768" y="915200"/>
+            <a:ext cx="5047878" cy="4571200"/>
           </a:xfrm>
           <a:prstGeom prst="rect">
             <a:avLst/>

</xml_diff>